<commit_message>
Update player and presentation
</commit_message>
<xml_diff>
--- a/Présentation.pptx
+++ b/Présentation.pptx
@@ -523,7 +523,88 @@
           <a:bodyPr/>
           <a:lstStyle/>
           <a:p>
-            <a:endParaRPr lang="fr-CH" dirty="0"/>
+            <a:r>
+              <a:rPr lang="fr-CH" dirty="0"/>
+              <a:t>Interface graphique </a:t>
+            </a:r>
+            <a:r>
+              <a:rPr lang="fr-CH" dirty="0">
+                <a:sym typeface="Wingdings" panose="05000000000000000000" pitchFamily="2" charset="2"/>
+              </a:rPr>
+              <a:t> </a:t>
+            </a:r>
+            <a:r>
+              <a:rPr lang="fr-CH" dirty="0" err="1">
+                <a:sym typeface="Wingdings" panose="05000000000000000000" pitchFamily="2" charset="2"/>
+              </a:rPr>
+              <a:t>Gab</a:t>
+            </a:r>
+            <a:endParaRPr lang="fr-CH" dirty="0">
+              <a:sym typeface="Wingdings" panose="05000000000000000000" pitchFamily="2" charset="2"/>
+            </a:endParaRPr>
+          </a:p>
+          <a:p>
+            <a:endParaRPr lang="fr-CH" dirty="0">
+              <a:sym typeface="Wingdings" panose="05000000000000000000" pitchFamily="2" charset="2"/>
+            </a:endParaRPr>
+          </a:p>
+          <a:p>
+            <a:r>
+              <a:rPr lang="fr-CH" dirty="0">
+                <a:sym typeface="Wingdings" panose="05000000000000000000" pitchFamily="2" charset="2"/>
+              </a:rPr>
+              <a:t>Stockage de donnée  </a:t>
+            </a:r>
+            <a:r>
+              <a:rPr lang="fr-CH" dirty="0" err="1">
+                <a:sym typeface="Wingdings" panose="05000000000000000000" pitchFamily="2" charset="2"/>
+              </a:rPr>
+              <a:t>Gab</a:t>
+            </a:r>
+            <a:r>
+              <a:rPr lang="fr-CH" dirty="0">
+                <a:sym typeface="Wingdings" panose="05000000000000000000" pitchFamily="2" charset="2"/>
+              </a:rPr>
+              <a:t>/Axel</a:t>
+            </a:r>
+          </a:p>
+          <a:p>
+            <a:endParaRPr lang="fr-CH" dirty="0">
+              <a:sym typeface="Wingdings" panose="05000000000000000000" pitchFamily="2" charset="2"/>
+            </a:endParaRPr>
+          </a:p>
+          <a:p>
+            <a:r>
+              <a:rPr lang="fr-CH" dirty="0">
+                <a:sym typeface="Wingdings" panose="05000000000000000000" pitchFamily="2" charset="2"/>
+              </a:rPr>
+              <a:t>Accéléromètre  Axel</a:t>
+            </a:r>
+          </a:p>
+          <a:p>
+            <a:endParaRPr lang="fr-CH" dirty="0">
+              <a:sym typeface="Wingdings" panose="05000000000000000000" pitchFamily="2" charset="2"/>
+            </a:endParaRPr>
+          </a:p>
+          <a:p>
+            <a:r>
+              <a:rPr lang="fr-CH" dirty="0">
+                <a:sym typeface="Wingdings" panose="05000000000000000000" pitchFamily="2" charset="2"/>
+              </a:rPr>
+              <a:t>Autre  </a:t>
+            </a:r>
+            <a:r>
+              <a:rPr lang="fr-CH" dirty="0" err="1">
+                <a:sym typeface="Wingdings" panose="05000000000000000000" pitchFamily="2" charset="2"/>
+              </a:rPr>
+              <a:t>Gab</a:t>
+            </a:r>
+            <a:r>
+              <a:rPr lang="fr-CH" dirty="0">
+                <a:sym typeface="Wingdings" panose="05000000000000000000" pitchFamily="2" charset="2"/>
+              </a:rPr>
+              <a:t>/Axel</a:t>
+            </a:r>
           </a:p>
         </p:txBody>
       </p:sp>
@@ -544,7 +625,7 @@
           <a:p>
             <a:fld id="{EC37260B-1DC5-48E4-BB85-1DFFBBA627B3}" type="slidenum">
               <a:rPr lang="fr-CH" smtClean="0"/>
-              <a:t>8</a:t>
+              <a:t>7</a:t>
             </a:fld>
             <a:endParaRPr lang="fr-CH"/>
           </a:p>
@@ -553,7 +634,7 @@
     </p:spTree>
     <p:extLst>
       <p:ext uri="{BB962C8B-B14F-4D97-AF65-F5344CB8AC3E}">
-        <p14:creationId xmlns:p14="http://schemas.microsoft.com/office/powerpoint/2010/main" val="2756209605"/>
+        <p14:creationId xmlns:p14="http://schemas.microsoft.com/office/powerpoint/2010/main" val="3680540902"/>
       </p:ext>
     </p:extLst>
   </p:cSld>
@@ -594,7 +675,7 @@
       </p:sp>
       <p:sp>
         <p:nvSpPr>
-          <p:cNvPr id="3" name="Espace réservé des commentaires 2"/>
+          <p:cNvPr id="3" name="Espace réservé des notes 2"/>
           <p:cNvSpPr>
             <a:spLocks noGrp="1"/>
           </p:cNvSpPr>
@@ -607,7 +688,456 @@
           <a:bodyPr/>
           <a:lstStyle/>
           <a:p>
+            <a:pPr marL="171450" indent="-171450">
+              <a:buFont typeface="Arial" panose="020B0604020202020204" pitchFamily="34" charset="0"/>
+              <a:buChar char="•"/>
+            </a:pPr>
+            <a:r>
+              <a:rPr lang="fr-CH" dirty="0"/>
+              <a:t>Interfaces</a:t>
+            </a:r>
+          </a:p>
+          <a:p>
+            <a:pPr marL="628650" lvl="1" indent="-171450">
+              <a:buFont typeface="Arial" panose="020B0604020202020204" pitchFamily="34" charset="0"/>
+              <a:buChar char="•"/>
+            </a:pPr>
+            <a:r>
+              <a:rPr lang="fr-CH" dirty="0"/>
+              <a:t>Simples</a:t>
+            </a:r>
+          </a:p>
+          <a:p>
+            <a:pPr marL="628650" lvl="1" indent="-171450">
+              <a:buFont typeface="Arial" panose="020B0604020202020204" pitchFamily="34" charset="0"/>
+              <a:buChar char="•"/>
+            </a:pPr>
+            <a:r>
+              <a:rPr lang="fr-CH" dirty="0"/>
+              <a:t>Ergonomiques</a:t>
+            </a:r>
+          </a:p>
+          <a:p>
+            <a:pPr marL="628650" lvl="1" indent="-171450">
+              <a:buFont typeface="Arial" panose="020B0604020202020204" pitchFamily="34" charset="0"/>
+              <a:buChar char="•"/>
+            </a:pPr>
+            <a:r>
+              <a:rPr lang="fr-CH" dirty="0"/>
+              <a:t>Sobres</a:t>
+            </a:r>
+          </a:p>
+          <a:p>
+            <a:pPr marL="628650" lvl="1" indent="-171450">
+              <a:buFont typeface="Arial" panose="020B0604020202020204" pitchFamily="34" charset="0"/>
+              <a:buChar char="•"/>
+            </a:pPr>
+            <a:r>
+              <a:rPr lang="fr-CH" dirty="0"/>
+              <a:t>Adaptée à différentes tailles</a:t>
+            </a:r>
+          </a:p>
+          <a:p>
+            <a:pPr marL="171450" lvl="0" indent="-171450">
+              <a:buFont typeface="Arial" panose="020B0604020202020204" pitchFamily="34" charset="0"/>
+              <a:buChar char="•"/>
+            </a:pPr>
+            <a:r>
+              <a:rPr lang="fr-CH" dirty="0"/>
+              <a:t>Classes</a:t>
+            </a:r>
+          </a:p>
+          <a:p>
+            <a:pPr marL="628650" lvl="1" indent="-171450">
+              <a:buFont typeface="Arial" panose="020B0604020202020204" pitchFamily="34" charset="0"/>
+              <a:buChar char="•"/>
+            </a:pPr>
+            <a:r>
+              <a:rPr lang="fr-CH" dirty="0"/>
+              <a:t>Jeu</a:t>
+            </a:r>
+          </a:p>
+          <a:p>
+            <a:pPr marL="1085850" lvl="2" indent="-171450">
+              <a:buFont typeface="Arial" panose="020B0604020202020204" pitchFamily="34" charset="0"/>
+              <a:buChar char="•"/>
+            </a:pPr>
+            <a:r>
+              <a:rPr lang="fr-CH" dirty="0" err="1"/>
+              <a:t>MenuActivity</a:t>
+            </a:r>
+            <a:r>
+              <a:rPr lang="fr-CH" dirty="0"/>
+              <a:t> </a:t>
+            </a:r>
+            <a:r>
+              <a:rPr lang="fr-CH" dirty="0">
+                <a:sym typeface="Wingdings" panose="05000000000000000000" pitchFamily="2" charset="2"/>
+              </a:rPr>
+              <a:t> </a:t>
+            </a:r>
+          </a:p>
+          <a:p>
+            <a:pPr marL="1085850" lvl="2" indent="-171450">
+              <a:buFont typeface="Arial" panose="020B0604020202020204" pitchFamily="34" charset="0"/>
+              <a:buChar char="•"/>
+            </a:pPr>
+            <a:r>
+              <a:rPr lang="fr-CH" dirty="0" err="1">
+                <a:sym typeface="Wingdings" panose="05000000000000000000" pitchFamily="2" charset="2"/>
+              </a:rPr>
+              <a:t>LoadActivity</a:t>
+            </a:r>
+            <a:r>
+              <a:rPr lang="fr-CH" dirty="0">
+                <a:sym typeface="Wingdings" panose="05000000000000000000" pitchFamily="2" charset="2"/>
+              </a:rPr>
+              <a:t>/</a:t>
+            </a:r>
+            <a:r>
+              <a:rPr lang="fr-CH" dirty="0" err="1">
+                <a:sym typeface="Wingdings" panose="05000000000000000000" pitchFamily="2" charset="2"/>
+              </a:rPr>
+              <a:t>IntroductionActivity</a:t>
+            </a:r>
+            <a:r>
+              <a:rPr lang="fr-CH" dirty="0">
+                <a:sym typeface="Wingdings" panose="05000000000000000000" pitchFamily="2" charset="2"/>
+              </a:rPr>
+              <a:t>  </a:t>
+            </a:r>
+          </a:p>
+          <a:p>
+            <a:pPr marL="1085850" lvl="2" indent="-171450">
+              <a:buFont typeface="Arial" panose="020B0604020202020204" pitchFamily="34" charset="0"/>
+              <a:buChar char="•"/>
+            </a:pPr>
+            <a:r>
+              <a:rPr lang="fr-CH" dirty="0" err="1">
+                <a:sym typeface="Wingdings" panose="05000000000000000000" pitchFamily="2" charset="2"/>
+              </a:rPr>
+              <a:t>GameActivity</a:t>
+            </a:r>
+            <a:r>
+              <a:rPr lang="fr-CH" dirty="0">
+                <a:sym typeface="Wingdings" panose="05000000000000000000" pitchFamily="2" charset="2"/>
+              </a:rPr>
+              <a:t> </a:t>
+            </a:r>
+          </a:p>
+          <a:p>
+            <a:pPr marL="628650" lvl="1" indent="-171450">
+              <a:buFont typeface="Arial" panose="020B0604020202020204" pitchFamily="34" charset="0"/>
+              <a:buChar char="•"/>
+            </a:pPr>
+            <a:r>
+              <a:rPr lang="fr-CH" dirty="0">
+                <a:sym typeface="Wingdings" panose="05000000000000000000" pitchFamily="2" charset="2"/>
+              </a:rPr>
+              <a:t>Histoire</a:t>
+            </a:r>
+          </a:p>
+          <a:p>
+            <a:pPr marL="1085850" lvl="2" indent="-171450">
+              <a:buFont typeface="Arial" panose="020B0604020202020204" pitchFamily="34" charset="0"/>
+              <a:buChar char="•"/>
+            </a:pPr>
+            <a:r>
+              <a:rPr lang="fr-CH" dirty="0" err="1">
+                <a:sym typeface="Wingdings" panose="05000000000000000000" pitchFamily="2" charset="2"/>
+              </a:rPr>
+              <a:t>HistoryNode</a:t>
+            </a:r>
+            <a:endParaRPr lang="fr-CH" dirty="0">
+              <a:sym typeface="Wingdings" panose="05000000000000000000" pitchFamily="2" charset="2"/>
+            </a:endParaRPr>
+          </a:p>
+          <a:p>
+            <a:pPr marL="628650" lvl="1" indent="-171450">
+              <a:buFont typeface="Arial" panose="020B0604020202020204" pitchFamily="34" charset="0"/>
+              <a:buChar char="•"/>
+            </a:pPr>
+            <a:r>
+              <a:rPr lang="fr-CH" dirty="0">
+                <a:sym typeface="Wingdings" panose="05000000000000000000" pitchFamily="2" charset="2"/>
+              </a:rPr>
+              <a:t>Données/Fichier</a:t>
+            </a:r>
+          </a:p>
+          <a:p>
+            <a:pPr marL="1085850" lvl="2" indent="-171450">
+              <a:buFont typeface="Arial" panose="020B0604020202020204" pitchFamily="34" charset="0"/>
+              <a:buChar char="•"/>
+            </a:pPr>
+            <a:r>
+              <a:rPr lang="fr-CH" dirty="0" err="1">
+                <a:sym typeface="Wingdings" panose="05000000000000000000" pitchFamily="2" charset="2"/>
+              </a:rPr>
+              <a:t>FileHandler</a:t>
+            </a:r>
+            <a:endParaRPr lang="fr-CH" dirty="0">
+              <a:sym typeface="Wingdings" panose="05000000000000000000" pitchFamily="2" charset="2"/>
+            </a:endParaRPr>
+          </a:p>
+          <a:p>
+            <a:pPr marL="628650" lvl="1" indent="-171450">
+              <a:buFont typeface="Arial" panose="020B0604020202020204" pitchFamily="34" charset="0"/>
+              <a:buChar char="•"/>
+            </a:pPr>
+            <a:r>
+              <a:rPr lang="fr-CH" dirty="0">
+                <a:sym typeface="Wingdings" panose="05000000000000000000" pitchFamily="2" charset="2"/>
+              </a:rPr>
+              <a:t>Autres</a:t>
+            </a:r>
+          </a:p>
+          <a:p>
+            <a:pPr marL="1085850" lvl="2" indent="-171450">
+              <a:buFont typeface="Arial" panose="020B0604020202020204" pitchFamily="34" charset="0"/>
+              <a:buChar char="•"/>
+            </a:pPr>
+            <a:r>
+              <a:rPr lang="fr-CH" dirty="0" err="1">
+                <a:sym typeface="Wingdings" panose="05000000000000000000" pitchFamily="2" charset="2"/>
+              </a:rPr>
+              <a:t>Accelerometer</a:t>
+            </a:r>
+            <a:endParaRPr lang="fr-CH" dirty="0">
+              <a:sym typeface="Wingdings" panose="05000000000000000000" pitchFamily="2" charset="2"/>
+            </a:endParaRPr>
+          </a:p>
+          <a:p>
+            <a:pPr marL="1085850" lvl="2" indent="-171450">
+              <a:buFont typeface="Arial" panose="020B0604020202020204" pitchFamily="34" charset="0"/>
+              <a:buChar char="•"/>
+            </a:pPr>
+            <a:r>
+              <a:rPr lang="fr-CH" dirty="0">
+                <a:sym typeface="Wingdings" panose="05000000000000000000" pitchFamily="2" charset="2"/>
+              </a:rPr>
+              <a:t>Player</a:t>
+            </a:r>
+          </a:p>
+          <a:p>
+            <a:pPr marL="171450" lvl="0" indent="-171450">
+              <a:buFont typeface="Arial" panose="020B0604020202020204" pitchFamily="34" charset="0"/>
+              <a:buChar char="•"/>
+            </a:pPr>
+            <a:r>
+              <a:rPr lang="fr-CH" dirty="0">
+                <a:sym typeface="Wingdings" panose="05000000000000000000" pitchFamily="2" charset="2"/>
+              </a:rPr>
+              <a:t>Stockage Données</a:t>
+            </a:r>
+          </a:p>
+          <a:p>
+            <a:pPr marL="628650" lvl="1" indent="-171450">
+              <a:buFont typeface="Arial" panose="020B0604020202020204" pitchFamily="34" charset="0"/>
+              <a:buChar char="•"/>
+            </a:pPr>
+            <a:r>
+              <a:rPr lang="fr-CH" dirty="0">
+                <a:sym typeface="Wingdings" panose="05000000000000000000" pitchFamily="2" charset="2"/>
+              </a:rPr>
+              <a:t>Fichier texte</a:t>
+            </a:r>
+          </a:p>
+          <a:p>
+            <a:pPr marL="628650" lvl="1" indent="-171450">
+              <a:buFont typeface="Arial" panose="020B0604020202020204" pitchFamily="34" charset="0"/>
+              <a:buChar char="•"/>
+            </a:pPr>
+            <a:r>
+              <a:rPr lang="fr-CH" dirty="0">
+                <a:sym typeface="Wingdings" panose="05000000000000000000" pitchFamily="2" charset="2"/>
+              </a:rPr>
+              <a:t>Vie</a:t>
+            </a:r>
+          </a:p>
+          <a:p>
+            <a:pPr marL="628650" lvl="1" indent="-171450">
+              <a:buFont typeface="Arial" panose="020B0604020202020204" pitchFamily="34" charset="0"/>
+              <a:buChar char="•"/>
+            </a:pPr>
+            <a:r>
+              <a:rPr lang="fr-CH" dirty="0">
+                <a:sym typeface="Wingdings" panose="05000000000000000000" pitchFamily="2" charset="2"/>
+              </a:rPr>
+              <a:t>Endurance</a:t>
+            </a:r>
+          </a:p>
+          <a:p>
+            <a:pPr marL="628650" lvl="1" indent="-171450">
+              <a:buFont typeface="Arial" panose="020B0604020202020204" pitchFamily="34" charset="0"/>
+              <a:buChar char="•"/>
+            </a:pPr>
+            <a:r>
+              <a:rPr lang="fr-CH" dirty="0">
+                <a:sym typeface="Wingdings" panose="05000000000000000000" pitchFamily="2" charset="2"/>
+              </a:rPr>
+              <a:t>…</a:t>
+            </a:r>
+          </a:p>
+          <a:p>
+            <a:pPr marL="171450" lvl="0" indent="-171450">
+              <a:buFont typeface="Arial" panose="020B0604020202020204" pitchFamily="34" charset="0"/>
+              <a:buChar char="•"/>
+            </a:pPr>
+            <a:r>
+              <a:rPr lang="fr-CH" dirty="0">
+                <a:sym typeface="Wingdings" panose="05000000000000000000" pitchFamily="2" charset="2"/>
+              </a:rPr>
+              <a:t>Accéléromètre </a:t>
+            </a:r>
+          </a:p>
+          <a:p>
+            <a:pPr marL="628650" lvl="1" indent="-171450">
+              <a:buFont typeface="Arial" panose="020B0604020202020204" pitchFamily="34" charset="0"/>
+              <a:buChar char="•"/>
+            </a:pPr>
+            <a:r>
+              <a:rPr lang="fr-CH" b="1" dirty="0"/>
+              <a:t>AXEL !!</a:t>
+            </a:r>
+          </a:p>
+          <a:p>
+            <a:pPr marL="171450" indent="-171450">
+              <a:buFont typeface="Arial" panose="020B0604020202020204" pitchFamily="34" charset="0"/>
+              <a:buChar char="•"/>
+            </a:pPr>
+            <a:endParaRPr lang="fr-CH" dirty="0"/>
+          </a:p>
+        </p:txBody>
+      </p:sp>
+      <p:sp>
+        <p:nvSpPr>
+          <p:cNvPr id="4" name="Espace réservé du numéro de diapositive 3"/>
+          <p:cNvSpPr>
+            <a:spLocks noGrp="1"/>
+          </p:cNvSpPr>
+          <p:nvPr>
+            <p:ph type="sldNum" sz="quarter" idx="10"/>
+          </p:nvPr>
+        </p:nvSpPr>
+        <p:spPr/>
+        <p:txBody>
+          <a:bodyPr/>
+          <a:lstStyle/>
+          <a:p>
+            <a:fld id="{EC37260B-1DC5-48E4-BB85-1DFFBBA627B3}" type="slidenum">
+              <a:rPr lang="fr-CH" smtClean="0"/>
+              <a:t>8</a:t>
+            </a:fld>
             <a:endParaRPr lang="fr-CH"/>
+          </a:p>
+        </p:txBody>
+      </p:sp>
+    </p:spTree>
+    <p:extLst>
+      <p:ext uri="{BB962C8B-B14F-4D97-AF65-F5344CB8AC3E}">
+        <p14:creationId xmlns:p14="http://schemas.microsoft.com/office/powerpoint/2010/main" val="2756209605"/>
+      </p:ext>
+    </p:extLst>
+  </p:cSld>
+  <p:clrMapOvr>
+    <a:masterClrMapping/>
+  </p:clrMapOvr>
+</p:notes>
+</file>
+
+<file path=ppt/notesSlides/notesSlide3.xml><?xml version="1.0" encoding="utf-8"?>
+<p:notes xmlns:a="http://schemas.openxmlformats.org/drawingml/2006/main" xmlns:r="http://schemas.openxmlformats.org/officeDocument/2006/relationships" xmlns:p="http://schemas.openxmlformats.org/presentationml/2006/main">
+  <p:cSld>
+    <p:spTree>
+      <p:nvGrpSpPr>
+        <p:cNvPr id="1" name=""/>
+        <p:cNvGrpSpPr/>
+        <p:nvPr/>
+      </p:nvGrpSpPr>
+      <p:grpSpPr>
+        <a:xfrm>
+          <a:off x="0" y="0"/>
+          <a:ext cx="0" cy="0"/>
+          <a:chOff x="0" y="0"/>
+          <a:chExt cx="0" cy="0"/>
+        </a:xfrm>
+      </p:grpSpPr>
+      <p:sp>
+        <p:nvSpPr>
+          <p:cNvPr id="2" name="Espace réservé de l'image des diapositives 1"/>
+          <p:cNvSpPr>
+            <a:spLocks noGrp="1" noRot="1" noChangeAspect="1"/>
+          </p:cNvSpPr>
+          <p:nvPr>
+            <p:ph type="sldImg"/>
+          </p:nvPr>
+        </p:nvSpPr>
+        <p:spPr/>
+      </p:sp>
+      <p:sp>
+        <p:nvSpPr>
+          <p:cNvPr id="3" name="Espace réservé des commentaires 2"/>
+          <p:cNvSpPr>
+            <a:spLocks noGrp="1"/>
+          </p:cNvSpPr>
+          <p:nvPr>
+            <p:ph type="body" idx="1"/>
+          </p:nvPr>
+        </p:nvSpPr>
+        <p:spPr/>
+        <p:txBody>
+          <a:bodyPr/>
+          <a:lstStyle/>
+          <a:p>
+            <a:r>
+              <a:rPr lang="fr-CH" dirty="0"/>
+              <a:t>Améliorations </a:t>
+            </a:r>
+            <a:r>
+              <a:rPr lang="fr-CH" dirty="0">
+                <a:sym typeface="Wingdings" panose="05000000000000000000" pitchFamily="2" charset="2"/>
+              </a:rPr>
+              <a:t> Ajout d’animations</a:t>
+            </a:r>
+          </a:p>
+          <a:p>
+            <a:r>
+              <a:rPr lang="fr-CH" dirty="0">
+                <a:sym typeface="Wingdings" panose="05000000000000000000" pitchFamily="2" charset="2"/>
+              </a:rPr>
+              <a:t>	Accéléromètre à améliorer</a:t>
+            </a:r>
+            <a:r>
+              <a:rPr lang="fr-CH" b="1" dirty="0">
+                <a:sym typeface="Wingdings" panose="05000000000000000000" pitchFamily="2" charset="2"/>
+              </a:rPr>
+              <a:t>… (AXEL)</a:t>
+            </a:r>
+          </a:p>
+          <a:p>
+            <a:r>
+              <a:rPr lang="fr-CH" dirty="0">
+                <a:sym typeface="Wingdings" panose="05000000000000000000" pitchFamily="2" charset="2"/>
+              </a:rPr>
+              <a:t>	Un autre chapitre</a:t>
+            </a:r>
+          </a:p>
+          <a:p>
+            <a:r>
+              <a:rPr lang="fr-CH" dirty="0">
+                <a:sym typeface="Wingdings" panose="05000000000000000000" pitchFamily="2" charset="2"/>
+              </a:rPr>
+              <a:t>	Marcher augmente l’endurance </a:t>
+            </a:r>
+          </a:p>
+          <a:p>
+            <a:r>
+              <a:rPr lang="fr-CH" dirty="0">
+                <a:sym typeface="Wingdings" panose="05000000000000000000" pitchFamily="2" charset="2"/>
+              </a:rPr>
+              <a:t>	</a:t>
+            </a:r>
+            <a:endParaRPr lang="fr-CH" dirty="0"/>
           </a:p>
         </p:txBody>
       </p:sp>
@@ -6818,7 +7348,7 @@
           <p:cNvPr id="2" name="Titre 1">
             <a:extLst>
               <a:ext uri="{FF2B5EF4-FFF2-40B4-BE49-F238E27FC236}">
-                <a16:creationId xmlns:a16="http://schemas.microsoft.com/office/drawing/2014/main" xmlns="" id="{0CFB33AD-2436-4082-A673-DA992A59D7CF}"/>
+                <a16:creationId xmlns:a16="http://schemas.microsoft.com/office/drawing/2014/main" id="{0CFB33AD-2436-4082-A673-DA992A59D7CF}"/>
               </a:ext>
             </a:extLst>
           </p:cNvPr>
@@ -6856,7 +7386,7 @@
           <p:cNvPr id="3" name="Sous-titre 2">
             <a:extLst>
               <a:ext uri="{FF2B5EF4-FFF2-40B4-BE49-F238E27FC236}">
-                <a16:creationId xmlns:a16="http://schemas.microsoft.com/office/drawing/2014/main" xmlns="" id="{9E2C14B6-E253-464E-B1EA-4FD993CE647E}"/>
+                <a16:creationId xmlns:a16="http://schemas.microsoft.com/office/drawing/2014/main" id="{9E2C14B6-E253-464E-B1EA-4FD993CE647E}"/>
               </a:ext>
             </a:extLst>
           </p:cNvPr>
@@ -6904,13 +7434,6 @@
   <p:clrMapOvr>
     <a:masterClrMapping/>
   </p:clrMapOvr>
-  <p:timing>
-    <p:tnLst>
-      <p:par>
-        <p:cTn id="1" dur="indefinite" restart="never" nodeType="tmRoot"/>
-      </p:par>
-    </p:tnLst>
-  </p:timing>
 </p:sld>
 </file>
 
@@ -6936,7 +7459,7 @@
           <p:cNvPr id="2" name="Titre 1">
             <a:extLst>
               <a:ext uri="{FF2B5EF4-FFF2-40B4-BE49-F238E27FC236}">
-                <a16:creationId xmlns:a16="http://schemas.microsoft.com/office/drawing/2014/main" xmlns="" id="{E3F33306-D4C8-47FD-B767-4C26F1291E90}"/>
+                <a16:creationId xmlns:a16="http://schemas.microsoft.com/office/drawing/2014/main" id="{E3F33306-D4C8-47FD-B767-4C26F1291E90}"/>
               </a:ext>
             </a:extLst>
           </p:cNvPr>
@@ -6970,7 +7493,7 @@
           <p:cNvPr id="3" name="Espace réservé du contenu 2">
             <a:extLst>
               <a:ext uri="{FF2B5EF4-FFF2-40B4-BE49-F238E27FC236}">
-                <a16:creationId xmlns:a16="http://schemas.microsoft.com/office/drawing/2014/main" xmlns="" id="{E2D72BF4-97A8-4FF9-9406-29B2A8E42FC2}"/>
+                <a16:creationId xmlns:a16="http://schemas.microsoft.com/office/drawing/2014/main" id="{E2D72BF4-97A8-4FF9-9406-29B2A8E42FC2}"/>
               </a:ext>
             </a:extLst>
           </p:cNvPr>
@@ -6997,64 +7520,45 @@
               <a:buNone/>
             </a:pPr>
             <a:r>
-              <a:rPr lang="fr-CH" dirty="0" smtClean="0"/>
+              <a:rPr lang="fr-CH" dirty="0"/>
               <a:t>Point positif</a:t>
             </a:r>
-            <a:endParaRPr lang="fr-CH" dirty="0" smtClean="0"/>
-          </a:p>
-          <a:p>
-            <a:r>
-              <a:rPr lang="fr-CH" dirty="0" smtClean="0"/>
-              <a:t>Le </a:t>
-            </a:r>
+          </a:p>
+          <a:p>
             <a:r>
               <a:rPr lang="fr-CH" dirty="0"/>
-              <a:t>projet est terminé et le cahier des charges est presque remplie</a:t>
+              <a:t>Le projet est terminé et le cahier des charges est presque remplie</a:t>
             </a:r>
           </a:p>
           <a:p>
             <a:r>
               <a:rPr lang="fr-CH" dirty="0"/>
-              <a:t>Le code est développé pour simplifier l’ajout de chapitre et pour </a:t>
-            </a:r>
-            <a:r>
-              <a:rPr lang="fr-CH" dirty="0" smtClean="0"/>
-              <a:t>l’implémentation </a:t>
-            </a:r>
+              <a:t>Le code est développé pour simplifier l’ajout de chapitre et pour l’implémentation de nouvelles fonctionnalités</a:t>
+            </a:r>
+          </a:p>
+          <a:p>
+            <a:endParaRPr lang="fr-CH" dirty="0"/>
+          </a:p>
+          <a:p>
+            <a:pPr marL="0" indent="0">
+              <a:buNone/>
+            </a:pPr>
             <a:r>
               <a:rPr lang="fr-CH" dirty="0"/>
-              <a:t>de nouvelles </a:t>
-            </a:r>
-            <a:r>
-              <a:rPr lang="fr-CH" dirty="0" smtClean="0"/>
-              <a:t>fonctionnalités</a:t>
-            </a:r>
-          </a:p>
-          <a:p>
-            <a:endParaRPr lang="fr-CH" dirty="0"/>
-          </a:p>
-          <a:p>
-            <a:pPr marL="0" indent="0">
-              <a:buNone/>
-            </a:pPr>
-            <a:r>
-              <a:rPr lang="fr-CH" dirty="0" smtClean="0"/>
               <a:t>Point négatif</a:t>
             </a:r>
-            <a:endParaRPr lang="fr-CH" dirty="0"/>
-          </a:p>
-          <a:p>
-            <a:r>
-              <a:rPr lang="fr-CH" dirty="0" smtClean="0"/>
+          </a:p>
+          <a:p>
+            <a:r>
+              <a:rPr lang="fr-CH" dirty="0"/>
               <a:t>Les animations des combats et des bonus ont été remplacés par des images</a:t>
             </a:r>
           </a:p>
           <a:p>
             <a:r>
-              <a:rPr lang="fr-CH" dirty="0" smtClean="0"/>
-              <a:t>L’utilisation de l’accéléromètre pour calculer une distance n’est pas très pratique</a:t>
-            </a:r>
-            <a:endParaRPr lang="fr-CH" dirty="0"/>
+              <a:rPr lang="fr-CH" dirty="0"/>
+              <a:t>L’utilisation de l’accéléromètre pour calculer une distance n’est pas très optimal</a:t>
+            </a:r>
           </a:p>
           <a:p>
             <a:endParaRPr lang="fr-CH" dirty="0"/>
@@ -7074,13 +7578,6 @@
   <p:clrMapOvr>
     <a:masterClrMapping/>
   </p:clrMapOvr>
-  <p:timing>
-    <p:tnLst>
-      <p:par>
-        <p:cTn id="1" dur="indefinite" restart="never" nodeType="tmRoot"/>
-      </p:par>
-    </p:tnLst>
-  </p:timing>
 </p:sld>
 </file>
 
@@ -7106,7 +7603,7 @@
           <p:cNvPr id="2" name="Titre 1">
             <a:extLst>
               <a:ext uri="{FF2B5EF4-FFF2-40B4-BE49-F238E27FC236}">
-                <a16:creationId xmlns:a16="http://schemas.microsoft.com/office/drawing/2014/main" xmlns="" id="{E3F33306-D4C8-47FD-B767-4C26F1291E90}"/>
+                <a16:creationId xmlns:a16="http://schemas.microsoft.com/office/drawing/2014/main" id="{E3F33306-D4C8-47FD-B767-4C26F1291E90}"/>
               </a:ext>
             </a:extLst>
           </p:cNvPr>
@@ -7171,7 +7668,7 @@
           <p:cNvPr id="2" name="Titre 1">
             <a:extLst>
               <a:ext uri="{FF2B5EF4-FFF2-40B4-BE49-F238E27FC236}">
-                <a16:creationId xmlns:a16="http://schemas.microsoft.com/office/drawing/2014/main" xmlns="" id="{E3F33306-D4C8-47FD-B767-4C26F1291E90}"/>
+                <a16:creationId xmlns:a16="http://schemas.microsoft.com/office/drawing/2014/main" id="{E3F33306-D4C8-47FD-B767-4C26F1291E90}"/>
               </a:ext>
             </a:extLst>
           </p:cNvPr>
@@ -7205,7 +7702,7 @@
           <p:cNvPr id="4" name="Espace réservé du contenu 2">
             <a:extLst>
               <a:ext uri="{FF2B5EF4-FFF2-40B4-BE49-F238E27FC236}">
-                <a16:creationId xmlns:a16="http://schemas.microsoft.com/office/drawing/2014/main" xmlns="" id="{049C4395-38C4-4B0C-8910-A8F7BF702D03}"/>
+                <a16:creationId xmlns:a16="http://schemas.microsoft.com/office/drawing/2014/main" id="{049C4395-38C4-4B0C-8910-A8F7BF702D03}"/>
               </a:ext>
             </a:extLst>
           </p:cNvPr>
@@ -7500,7 +7997,7 @@
           <p:cNvPr id="7" name="Image 6">
             <a:extLst>
               <a:ext uri="{FF2B5EF4-FFF2-40B4-BE49-F238E27FC236}">
-                <a16:creationId xmlns:a16="http://schemas.microsoft.com/office/drawing/2014/main" xmlns="" id="{660BB3DA-E17E-4553-9B13-8D9843788D48}"/>
+                <a16:creationId xmlns:a16="http://schemas.microsoft.com/office/drawing/2014/main" id="{660BB3DA-E17E-4553-9B13-8D9843788D48}"/>
               </a:ext>
             </a:extLst>
           </p:cNvPr>
@@ -7566,7 +8063,7 @@
           <p:cNvPr id="2" name="Titre 1">
             <a:extLst>
               <a:ext uri="{FF2B5EF4-FFF2-40B4-BE49-F238E27FC236}">
-                <a16:creationId xmlns:a16="http://schemas.microsoft.com/office/drawing/2014/main" xmlns="" id="{E3F33306-D4C8-47FD-B767-4C26F1291E90}"/>
+                <a16:creationId xmlns:a16="http://schemas.microsoft.com/office/drawing/2014/main" id="{E3F33306-D4C8-47FD-B767-4C26F1291E90}"/>
               </a:ext>
             </a:extLst>
           </p:cNvPr>
@@ -7600,7 +8097,7 @@
           <p:cNvPr id="3" name="Espace réservé du contenu 2">
             <a:extLst>
               <a:ext uri="{FF2B5EF4-FFF2-40B4-BE49-F238E27FC236}">
-                <a16:creationId xmlns:a16="http://schemas.microsoft.com/office/drawing/2014/main" xmlns="" id="{E2D72BF4-97A8-4FF9-9406-29B2A8E42FC2}"/>
+                <a16:creationId xmlns:a16="http://schemas.microsoft.com/office/drawing/2014/main" id="{E2D72BF4-97A8-4FF9-9406-29B2A8E42FC2}"/>
               </a:ext>
             </a:extLst>
           </p:cNvPr>
@@ -7684,7 +8181,7 @@
           <p:cNvPr id="2" name="Titre 1">
             <a:extLst>
               <a:ext uri="{FF2B5EF4-FFF2-40B4-BE49-F238E27FC236}">
-                <a16:creationId xmlns:a16="http://schemas.microsoft.com/office/drawing/2014/main" xmlns="" id="{E3F33306-D4C8-47FD-B767-4C26F1291E90}"/>
+                <a16:creationId xmlns:a16="http://schemas.microsoft.com/office/drawing/2014/main" id="{E3F33306-D4C8-47FD-B767-4C26F1291E90}"/>
               </a:ext>
             </a:extLst>
           </p:cNvPr>
@@ -7718,7 +8215,7 @@
           <p:cNvPr id="3" name="Espace réservé du contenu 2">
             <a:extLst>
               <a:ext uri="{FF2B5EF4-FFF2-40B4-BE49-F238E27FC236}">
-                <a16:creationId xmlns:a16="http://schemas.microsoft.com/office/drawing/2014/main" xmlns="" id="{E2D72BF4-97A8-4FF9-9406-29B2A8E42FC2}"/>
+                <a16:creationId xmlns:a16="http://schemas.microsoft.com/office/drawing/2014/main" id="{E2D72BF4-97A8-4FF9-9406-29B2A8E42FC2}"/>
               </a:ext>
             </a:extLst>
           </p:cNvPr>
@@ -7824,7 +8321,7 @@
           <p:cNvPr id="67" name="Group 35">
             <a:extLst>
               <a:ext uri="{FF2B5EF4-FFF2-40B4-BE49-F238E27FC236}">
-                <a16:creationId xmlns:a16="http://schemas.microsoft.com/office/drawing/2014/main" xmlns="" id="{D6BA167A-D3C3-4EE8-8B5E-13679208725E}"/>
+                <a16:creationId xmlns:a16="http://schemas.microsoft.com/office/drawing/2014/main" id="{D6BA167A-D3C3-4EE8-8B5E-13679208725E}"/>
               </a:ext>
             </a:extLst>
           </p:cNvPr>
@@ -7834,7 +8331,7 @@
           <p:nvPr>
             <p:extLst>
               <p:ext uri="{386F3935-93C4-4BCD-93E2-E3B085C9AB24}">
-                <p16:designElem xmlns:p16="http://schemas.microsoft.com/office/powerpoint/2015/main" xmlns="" val="1"/>
+                <p16:designElem xmlns:p16="http://schemas.microsoft.com/office/powerpoint/2015/main" val="1"/>
               </p:ext>
             </p:extLst>
           </p:nvPr>
@@ -7852,7 +8349,7 @@
             <p:cNvPr id="37" name="Freeform 6">
               <a:extLst>
                 <a:ext uri="{FF2B5EF4-FFF2-40B4-BE49-F238E27FC236}">
-                  <a16:creationId xmlns:a16="http://schemas.microsoft.com/office/drawing/2014/main" xmlns="" id="{810CA83B-630E-45DB-ADCB-F0260428513D}"/>
+                  <a16:creationId xmlns:a16="http://schemas.microsoft.com/office/drawing/2014/main" id="{810CA83B-630E-45DB-ADCB-F0260428513D}"/>
                 </a:ext>
               </a:extLst>
             </p:cNvPr>
@@ -7860,7 +8357,7 @@
             <p:nvPr>
               <p:extLst>
                 <p:ext uri="{386F3935-93C4-4BCD-93E2-E3B085C9AB24}">
-                  <p16:designElem xmlns:p16="http://schemas.microsoft.com/office/powerpoint/2015/main" xmlns="" val="1"/>
+                  <p16:designElem xmlns:p16="http://schemas.microsoft.com/office/powerpoint/2015/main" val="1"/>
                 </p:ext>
               </p:extLst>
             </p:nvPr>
@@ -7910,7 +8407,7 @@
             <p:cNvPr id="38" name="Freeform 7">
               <a:extLst>
                 <a:ext uri="{FF2B5EF4-FFF2-40B4-BE49-F238E27FC236}">
-                  <a16:creationId xmlns:a16="http://schemas.microsoft.com/office/drawing/2014/main" xmlns="" id="{7A57B554-6973-429A-818B-524C03DA479E}"/>
+                  <a16:creationId xmlns:a16="http://schemas.microsoft.com/office/drawing/2014/main" id="{7A57B554-6973-429A-818B-524C03DA479E}"/>
                 </a:ext>
               </a:extLst>
             </p:cNvPr>
@@ -7918,7 +8415,7 @@
             <p:nvPr>
               <p:extLst>
                 <p:ext uri="{386F3935-93C4-4BCD-93E2-E3B085C9AB24}">
-                  <p16:designElem xmlns:p16="http://schemas.microsoft.com/office/powerpoint/2015/main" xmlns="" val="1"/>
+                  <p16:designElem xmlns:p16="http://schemas.microsoft.com/office/powerpoint/2015/main" val="1"/>
                 </p:ext>
               </p:extLst>
             </p:nvPr>
@@ -7974,7 +8471,7 @@
             <p:cNvPr id="39" name="Freeform 9">
               <a:extLst>
                 <a:ext uri="{FF2B5EF4-FFF2-40B4-BE49-F238E27FC236}">
-                  <a16:creationId xmlns:a16="http://schemas.microsoft.com/office/drawing/2014/main" xmlns="" id="{89ED2DB2-F3BB-4B5E-84E6-CC259E394AF3}"/>
+                  <a16:creationId xmlns:a16="http://schemas.microsoft.com/office/drawing/2014/main" id="{89ED2DB2-F3BB-4B5E-84E6-CC259E394AF3}"/>
                 </a:ext>
               </a:extLst>
             </p:cNvPr>
@@ -7982,7 +8479,7 @@
             <p:nvPr>
               <p:extLst>
                 <p:ext uri="{386F3935-93C4-4BCD-93E2-E3B085C9AB24}">
-                  <p16:designElem xmlns:p16="http://schemas.microsoft.com/office/powerpoint/2015/main" xmlns="" val="1"/>
+                  <p16:designElem xmlns:p16="http://schemas.microsoft.com/office/powerpoint/2015/main" val="1"/>
                 </p:ext>
               </p:extLst>
             </p:nvPr>
@@ -8032,7 +8529,7 @@
             <p:cNvPr id="40" name="Freeform 10">
               <a:extLst>
                 <a:ext uri="{FF2B5EF4-FFF2-40B4-BE49-F238E27FC236}">
-                  <a16:creationId xmlns:a16="http://schemas.microsoft.com/office/drawing/2014/main" xmlns="" id="{93816493-5723-43CF-95A9-2CDEC9B11D76}"/>
+                  <a16:creationId xmlns:a16="http://schemas.microsoft.com/office/drawing/2014/main" id="{93816493-5723-43CF-95A9-2CDEC9B11D76}"/>
                 </a:ext>
               </a:extLst>
             </p:cNvPr>
@@ -8040,7 +8537,7 @@
             <p:nvPr>
               <p:extLst>
                 <p:ext uri="{386F3935-93C4-4BCD-93E2-E3B085C9AB24}">
-                  <p16:designElem xmlns:p16="http://schemas.microsoft.com/office/powerpoint/2015/main" xmlns="" val="1"/>
+                  <p16:designElem xmlns:p16="http://schemas.microsoft.com/office/powerpoint/2015/main" val="1"/>
                 </p:ext>
               </p:extLst>
             </p:nvPr>
@@ -8089,7 +8586,7 @@
             <p:cNvPr id="41" name="Freeform 11">
               <a:extLst>
                 <a:ext uri="{FF2B5EF4-FFF2-40B4-BE49-F238E27FC236}">
-                  <a16:creationId xmlns:a16="http://schemas.microsoft.com/office/drawing/2014/main" xmlns="" id="{A9964935-0316-4743-BD2E-35B86AF480C4}"/>
+                  <a16:creationId xmlns:a16="http://schemas.microsoft.com/office/drawing/2014/main" id="{A9964935-0316-4743-BD2E-35B86AF480C4}"/>
                 </a:ext>
               </a:extLst>
             </p:cNvPr>
@@ -8097,7 +8594,7 @@
             <p:nvPr>
               <p:extLst>
                 <p:ext uri="{386F3935-93C4-4BCD-93E2-E3B085C9AB24}">
-                  <p16:designElem xmlns:p16="http://schemas.microsoft.com/office/powerpoint/2015/main" xmlns="" val="1"/>
+                  <p16:designElem xmlns:p16="http://schemas.microsoft.com/office/powerpoint/2015/main" val="1"/>
                 </p:ext>
               </p:extLst>
             </p:nvPr>
@@ -8152,7 +8649,7 @@
             <p:cNvPr id="42" name="Freeform 12">
               <a:extLst>
                 <a:ext uri="{FF2B5EF4-FFF2-40B4-BE49-F238E27FC236}">
-                  <a16:creationId xmlns:a16="http://schemas.microsoft.com/office/drawing/2014/main" xmlns="" id="{2B20A700-1547-48D5-AA6F-C1473539C70F}"/>
+                  <a16:creationId xmlns:a16="http://schemas.microsoft.com/office/drawing/2014/main" id="{2B20A700-1547-48D5-AA6F-C1473539C70F}"/>
                 </a:ext>
               </a:extLst>
             </p:cNvPr>
@@ -8160,7 +8657,7 @@
             <p:nvPr>
               <p:extLst>
                 <p:ext uri="{386F3935-93C4-4BCD-93E2-E3B085C9AB24}">
-                  <p16:designElem xmlns:p16="http://schemas.microsoft.com/office/powerpoint/2015/main" xmlns="" val="1"/>
+                  <p16:designElem xmlns:p16="http://schemas.microsoft.com/office/powerpoint/2015/main" val="1"/>
                 </p:ext>
               </p:extLst>
             </p:nvPr>
@@ -8223,7 +8720,7 @@
           <p:cNvPr id="68" name="Image 3">
             <a:extLst>
               <a:ext uri="{FF2B5EF4-FFF2-40B4-BE49-F238E27FC236}">
-                <a16:creationId xmlns:a16="http://schemas.microsoft.com/office/drawing/2014/main" xmlns="" id="{18141A38-AC60-4E7E-8F00-FFAA456581A5}"/>
+                <a16:creationId xmlns:a16="http://schemas.microsoft.com/office/drawing/2014/main" id="{18141A38-AC60-4E7E-8F00-FFAA456581A5}"/>
               </a:ext>
             </a:extLst>
           </p:cNvPr>
@@ -8279,7 +8776,7 @@
           <p:cNvPr id="2" name="Titre 1">
             <a:extLst>
               <a:ext uri="{FF2B5EF4-FFF2-40B4-BE49-F238E27FC236}">
-                <a16:creationId xmlns:a16="http://schemas.microsoft.com/office/drawing/2014/main" xmlns="" id="{CA7F0D2B-BBB7-4CF6-824A-DFB52F783BF6}"/>
+                <a16:creationId xmlns:a16="http://schemas.microsoft.com/office/drawing/2014/main" id="{CA7F0D2B-BBB7-4CF6-824A-DFB52F783BF6}"/>
               </a:ext>
             </a:extLst>
           </p:cNvPr>
@@ -8357,7 +8854,7 @@
           <p:cNvPr id="2" name="Titre 1">
             <a:extLst>
               <a:ext uri="{FF2B5EF4-FFF2-40B4-BE49-F238E27FC236}">
-                <a16:creationId xmlns:a16="http://schemas.microsoft.com/office/drawing/2014/main" xmlns="" id="{E3F33306-D4C8-47FD-B767-4C26F1291E90}"/>
+                <a16:creationId xmlns:a16="http://schemas.microsoft.com/office/drawing/2014/main" id="{E3F33306-D4C8-47FD-B767-4C26F1291E90}"/>
               </a:ext>
             </a:extLst>
           </p:cNvPr>
@@ -8391,7 +8888,7 @@
           <p:cNvPr id="3" name="Espace réservé du contenu 2">
             <a:extLst>
               <a:ext uri="{FF2B5EF4-FFF2-40B4-BE49-F238E27FC236}">
-                <a16:creationId xmlns:a16="http://schemas.microsoft.com/office/drawing/2014/main" xmlns="" id="{E2D72BF4-97A8-4FF9-9406-29B2A8E42FC2}"/>
+                <a16:creationId xmlns:a16="http://schemas.microsoft.com/office/drawing/2014/main" id="{E2D72BF4-97A8-4FF9-9406-29B2A8E42FC2}"/>
               </a:ext>
             </a:extLst>
           </p:cNvPr>
@@ -8445,7 +8942,7 @@
           <p:cNvPr id="4" name="Image 3">
             <a:extLst>
               <a:ext uri="{FF2B5EF4-FFF2-40B4-BE49-F238E27FC236}">
-                <a16:creationId xmlns:a16="http://schemas.microsoft.com/office/drawing/2014/main" xmlns="" id="{FAF10768-8CD8-4EE8-98C2-8C9C124CCFC6}"/>
+                <a16:creationId xmlns:a16="http://schemas.microsoft.com/office/drawing/2014/main" id="{FAF10768-8CD8-4EE8-98C2-8C9C124CCFC6}"/>
               </a:ext>
             </a:extLst>
           </p:cNvPr>
@@ -8475,7 +8972,7 @@
           <p:cNvPr id="5" name="Image 4">
             <a:extLst>
               <a:ext uri="{FF2B5EF4-FFF2-40B4-BE49-F238E27FC236}">
-                <a16:creationId xmlns:a16="http://schemas.microsoft.com/office/drawing/2014/main" xmlns="" id="{07C8896F-D9DD-4F5E-B4CD-7B458002FB07}"/>
+                <a16:creationId xmlns:a16="http://schemas.microsoft.com/office/drawing/2014/main" id="{07C8896F-D9DD-4F5E-B4CD-7B458002FB07}"/>
               </a:ext>
             </a:extLst>
           </p:cNvPr>
@@ -8505,7 +9002,7 @@
           <p:cNvPr id="6" name="Image 5">
             <a:extLst>
               <a:ext uri="{FF2B5EF4-FFF2-40B4-BE49-F238E27FC236}">
-                <a16:creationId xmlns:a16="http://schemas.microsoft.com/office/drawing/2014/main" xmlns="" id="{E7EF9D6E-222B-4579-BB16-23E565DB9B51}"/>
+                <a16:creationId xmlns:a16="http://schemas.microsoft.com/office/drawing/2014/main" id="{E7EF9D6E-222B-4579-BB16-23E565DB9B51}"/>
               </a:ext>
             </a:extLst>
           </p:cNvPr>
@@ -8535,7 +9032,7 @@
           <p:cNvPr id="7" name="Image 6">
             <a:extLst>
               <a:ext uri="{FF2B5EF4-FFF2-40B4-BE49-F238E27FC236}">
-                <a16:creationId xmlns:a16="http://schemas.microsoft.com/office/drawing/2014/main" xmlns="" id="{1AACB9B4-3BEE-49F9-B84B-98CF69073D91}"/>
+                <a16:creationId xmlns:a16="http://schemas.microsoft.com/office/drawing/2014/main" id="{1AACB9B4-3BEE-49F9-B84B-98CF69073D91}"/>
               </a:ext>
             </a:extLst>
           </p:cNvPr>
@@ -8565,7 +9062,7 @@
           <p:cNvPr id="8" name="Image 7">
             <a:extLst>
               <a:ext uri="{FF2B5EF4-FFF2-40B4-BE49-F238E27FC236}">
-                <a16:creationId xmlns:a16="http://schemas.microsoft.com/office/drawing/2014/main" xmlns="" id="{4BD348E5-9ADC-4CAB-861F-210D20AE68DB}"/>
+                <a16:creationId xmlns:a16="http://schemas.microsoft.com/office/drawing/2014/main" id="{4BD348E5-9ADC-4CAB-861F-210D20AE68DB}"/>
               </a:ext>
             </a:extLst>
           </p:cNvPr>
@@ -8925,7 +9422,7 @@
           <p:cNvPr id="2" name="Titre 1">
             <a:extLst>
               <a:ext uri="{FF2B5EF4-FFF2-40B4-BE49-F238E27FC236}">
-                <a16:creationId xmlns:a16="http://schemas.microsoft.com/office/drawing/2014/main" xmlns="" id="{E3F33306-D4C8-47FD-B767-4C26F1291E90}"/>
+                <a16:creationId xmlns:a16="http://schemas.microsoft.com/office/drawing/2014/main" id="{E3F33306-D4C8-47FD-B767-4C26F1291E90}"/>
               </a:ext>
             </a:extLst>
           </p:cNvPr>
@@ -8959,7 +9456,7 @@
           <p:cNvPr id="4" name="Image 3">
             <a:extLst>
               <a:ext uri="{FF2B5EF4-FFF2-40B4-BE49-F238E27FC236}">
-                <a16:creationId xmlns:a16="http://schemas.microsoft.com/office/drawing/2014/main" xmlns="" id="{2687339F-4F5B-4691-97F3-898FC5A89D2D}"/>
+                <a16:creationId xmlns:a16="http://schemas.microsoft.com/office/drawing/2014/main" id="{2687339F-4F5B-4691-97F3-898FC5A89D2D}"/>
               </a:ext>
             </a:extLst>
           </p:cNvPr>
@@ -8969,7 +9466,7 @@
           <p:nvPr/>
         </p:nvPicPr>
         <p:blipFill>
-          <a:blip r:embed="rId2">
+          <a:blip r:embed="rId3">
             <a:extLst>
               <a:ext uri="{28A0092B-C50C-407E-A947-70E740481C1C}">
                 <a14:useLocalDpi xmlns:a14="http://schemas.microsoft.com/office/drawing/2010/main" val="0"/>
@@ -8995,7 +9492,7 @@
           <p:cNvPr id="5" name="Espace réservé du contenu 2">
             <a:extLst>
               <a:ext uri="{FF2B5EF4-FFF2-40B4-BE49-F238E27FC236}">
-                <a16:creationId xmlns:a16="http://schemas.microsoft.com/office/drawing/2014/main" xmlns="" id="{CEB61D05-2C97-4939-9A58-2F5E68DED6BF}"/>
+                <a16:creationId xmlns:a16="http://schemas.microsoft.com/office/drawing/2014/main" id="{CEB61D05-2C97-4939-9A58-2F5E68DED6BF}"/>
               </a:ext>
             </a:extLst>
           </p:cNvPr>
@@ -9013,8 +9510,16 @@
           </a:xfrm>
         </p:spPr>
         <p:txBody>
-          <a:bodyPr anchor="t" anchorCtr="0"/>
+          <a:bodyPr anchor="t" anchorCtr="0">
+            <a:normAutofit/>
+          </a:bodyPr>
           <a:lstStyle/>
+          <a:p>
+            <a:r>
+              <a:rPr lang="fr-CH" dirty="0"/>
+              <a:t>Accéléromètre</a:t>
+            </a:r>
+          </a:p>
           <a:p>
             <a:r>
               <a:rPr lang="fr-CH" dirty="0"/>
@@ -9025,12 +9530,6 @@
             <a:r>
               <a:rPr lang="fr-CH" dirty="0"/>
               <a:t>Stockage de données</a:t>
-            </a:r>
-          </a:p>
-          <a:p>
-            <a:r>
-              <a:rPr lang="fr-CH" dirty="0"/>
-              <a:t>Accéléromètre</a:t>
             </a:r>
           </a:p>
           <a:p>
@@ -9079,7 +9578,7 @@
           <p:cNvPr id="2" name="Titre 1">
             <a:extLst>
               <a:ext uri="{FF2B5EF4-FFF2-40B4-BE49-F238E27FC236}">
-                <a16:creationId xmlns:a16="http://schemas.microsoft.com/office/drawing/2014/main" xmlns="" id="{E3F33306-D4C8-47FD-B767-4C26F1291E90}"/>
+                <a16:creationId xmlns:a16="http://schemas.microsoft.com/office/drawing/2014/main" id="{E3F33306-D4C8-47FD-B767-4C26F1291E90}"/>
               </a:ext>
             </a:extLst>
           </p:cNvPr>
@@ -9113,7 +9612,7 @@
           <p:cNvPr id="3" name="Espace réservé du contenu 2">
             <a:extLst>
               <a:ext uri="{FF2B5EF4-FFF2-40B4-BE49-F238E27FC236}">
-                <a16:creationId xmlns:a16="http://schemas.microsoft.com/office/drawing/2014/main" xmlns="" id="{E2D72BF4-97A8-4FF9-9406-29B2A8E42FC2}"/>
+                <a16:creationId xmlns:a16="http://schemas.microsoft.com/office/drawing/2014/main" id="{E2D72BF4-97A8-4FF9-9406-29B2A8E42FC2}"/>
               </a:ext>
             </a:extLst>
           </p:cNvPr>
@@ -9181,7 +9680,7 @@
           <p:cNvPr id="7" name="Image 6">
             <a:extLst>
               <a:ext uri="{FF2B5EF4-FFF2-40B4-BE49-F238E27FC236}">
-                <a16:creationId xmlns:a16="http://schemas.microsoft.com/office/drawing/2014/main" xmlns="" id="{2D8FE7BE-EB47-4600-97C2-2F17178C74FE}"/>
+                <a16:creationId xmlns:a16="http://schemas.microsoft.com/office/drawing/2014/main" id="{2D8FE7BE-EB47-4600-97C2-2F17178C74FE}"/>
               </a:ext>
             </a:extLst>
           </p:cNvPr>
@@ -9247,7 +9746,7 @@
           <p:cNvPr id="2" name="Titre 1">
             <a:extLst>
               <a:ext uri="{FF2B5EF4-FFF2-40B4-BE49-F238E27FC236}">
-                <a16:creationId xmlns:a16="http://schemas.microsoft.com/office/drawing/2014/main" xmlns="" id="{E3F33306-D4C8-47FD-B767-4C26F1291E90}"/>
+                <a16:creationId xmlns:a16="http://schemas.microsoft.com/office/drawing/2014/main" id="{E3F33306-D4C8-47FD-B767-4C26F1291E90}"/>
               </a:ext>
             </a:extLst>
           </p:cNvPr>
@@ -9289,13 +9788,6 @@
   <p:clrMapOvr>
     <a:masterClrMapping/>
   </p:clrMapOvr>
-  <p:timing>
-    <p:tnLst>
-      <p:par>
-        <p:cTn id="1" dur="indefinite" restart="never" nodeType="tmRoot"/>
-      </p:par>
-    </p:tnLst>
-  </p:timing>
 </p:sld>
 </file>
 

</xml_diff>

<commit_message>
Update rapport and project
</commit_message>
<xml_diff>
--- a/Présentation.pptx
+++ b/Présentation.pptx
@@ -211,7 +211,7 @@
           <a:p>
             <a:fld id="{2EF6F3D7-FDF1-499B-B81F-F24850E7FDA6}" type="datetimeFigureOut">
               <a:rPr lang="fr-CH" smtClean="0"/>
-              <a:t>25.01.2018</a:t>
+              <a:t>26.01.2018</a:t>
             </a:fld>
             <a:endParaRPr lang="fr-CH"/>
           </a:p>
@@ -972,11 +972,38 @@
               <a:buChar char="•"/>
             </a:pPr>
             <a:r>
+              <a:rPr lang="fr-CH" dirty="0" err="1">
+                <a:sym typeface="Wingdings" panose="05000000000000000000" pitchFamily="2" charset="2"/>
+              </a:rPr>
+              <a:t>NbChapitre</a:t>
+            </a:r>
+            <a:r>
               <a:rPr lang="fr-CH" dirty="0">
                 <a:sym typeface="Wingdings" panose="05000000000000000000" pitchFamily="2" charset="2"/>
               </a:rPr>
-              <a:t>…</a:t>
-            </a:r>
+              <a:t>  Plus </a:t>
+            </a:r>
+            <a:r>
+              <a:rPr lang="fr-CH" dirty="0" err="1">
+                <a:sym typeface="Wingdings" panose="05000000000000000000" pitchFamily="2" charset="2"/>
+              </a:rPr>
+              <a:t>chap</a:t>
+            </a:r>
+            <a:r>
+              <a:rPr lang="fr-CH" dirty="0">
+                <a:sym typeface="Wingdings" panose="05000000000000000000" pitchFamily="2" charset="2"/>
+              </a:rPr>
+              <a:t> grand, plus ennemi </a:t>
+            </a:r>
+            <a:r>
+              <a:rPr lang="fr-CH">
+                <a:sym typeface="Wingdings" panose="05000000000000000000" pitchFamily="2" charset="2"/>
+              </a:rPr>
+              <a:t>est puissant</a:t>
+            </a:r>
+            <a:endParaRPr lang="fr-CH" dirty="0">
+              <a:sym typeface="Wingdings" panose="05000000000000000000" pitchFamily="2" charset="2"/>
+            </a:endParaRPr>
           </a:p>
           <a:p>
             <a:pPr marL="171450" lvl="0" indent="-171450">
@@ -996,11 +1023,11 @@
               <a:buChar char="•"/>
             </a:pPr>
             <a:r>
-              <a:rPr lang="fr-CH" b="0" dirty="0" smtClean="0"/>
+              <a:rPr lang="fr-CH" b="0" dirty="0"/>
               <a:t>Liste des</a:t>
             </a:r>
             <a:r>
-              <a:rPr lang="fr-CH" b="0" baseline="0" dirty="0" smtClean="0"/>
+              <a:rPr lang="fr-CH" b="0" baseline="0" dirty="0"/>
               <a:t> accélérations pendant 4 secondes</a:t>
             </a:r>
           </a:p>
@@ -1010,7 +1037,7 @@
               <a:buChar char="•"/>
             </a:pPr>
             <a:r>
-              <a:rPr lang="fr-CH" b="0" baseline="0" dirty="0" smtClean="0"/>
+              <a:rPr lang="fr-CH" b="0" baseline="0" dirty="0"/>
               <a:t>Calcul l’accélération moyenne</a:t>
             </a:r>
           </a:p>
@@ -1020,7 +1047,7 @@
               <a:buChar char="•"/>
             </a:pPr>
             <a:r>
-              <a:rPr lang="fr-CH" b="0" baseline="0" dirty="0" smtClean="0"/>
+              <a:rPr lang="fr-CH" b="0" baseline="0" dirty="0"/>
               <a:t>Calcul une distance avec cette accélération</a:t>
             </a:r>
           </a:p>
@@ -1030,14 +1057,9 @@
               <a:buChar char="•"/>
             </a:pPr>
             <a:r>
-              <a:rPr lang="fr-CH" b="0" baseline="0" dirty="0" smtClean="0"/>
-              <a:t>Si cette distance est plus grande que 15 mètre la fuite </a:t>
-            </a:r>
-            <a:r>
-              <a:rPr lang="fr-CH" b="0" baseline="0" smtClean="0"/>
-              <a:t>est validé</a:t>
-            </a:r>
-            <a:endParaRPr lang="fr-CH" b="0" baseline="0" dirty="0" smtClean="0"/>
+              <a:rPr lang="fr-CH" b="0" baseline="0" dirty="0"/>
+              <a:t>Si cette distance est plus grande que 15 mètre la fuite est validé</a:t>
+            </a:r>
           </a:p>
           <a:p>
             <a:pPr marL="628650" lvl="1" indent="-171450">
@@ -1151,28 +1173,22 @@
               <a:rPr lang="fr-CH" dirty="0">
                 <a:sym typeface="Wingdings" panose="05000000000000000000" pitchFamily="2" charset="2"/>
               </a:rPr>
-              <a:t>	</a:t>
-            </a:r>
-            <a:r>
-              <a:rPr lang="fr-CH" dirty="0" smtClean="0">
-                <a:sym typeface="Wingdings" panose="05000000000000000000" pitchFamily="2" charset="2"/>
-              </a:rPr>
-              <a:t>L’accéléromètre marche mais malheureusement</a:t>
-            </a:r>
-            <a:r>
-              <a:rPr lang="fr-CH" baseline="0" dirty="0" smtClean="0">
+              <a:t>	L’accéléromètre marche mais malheureusement</a:t>
+            </a:r>
+            <a:r>
+              <a:rPr lang="fr-CH" baseline="0" dirty="0">
                 <a:sym typeface="Wingdings" panose="05000000000000000000" pitchFamily="2" charset="2"/>
               </a:rPr>
               <a:t> il n’est pas fait pour calculer des distances d’une course, puisqu’il suffit de l’agiter dans tous les sens pour créer de grandes 	accélérations, pour ce genre de mesure il faut plutôt utiliser le </a:t>
             </a:r>
             <a:r>
-              <a:rPr lang="fr-CH" baseline="0" dirty="0" err="1" smtClean="0">
+              <a:rPr lang="fr-CH" baseline="0" dirty="0" err="1">
                 <a:sym typeface="Wingdings" panose="05000000000000000000" pitchFamily="2" charset="2"/>
               </a:rPr>
               <a:t>gps</a:t>
             </a:r>
             <a:r>
-              <a:rPr lang="fr-CH" baseline="0" dirty="0" smtClean="0">
+              <a:rPr lang="fr-CH" baseline="0" dirty="0">
                 <a:sym typeface="Wingdings" panose="05000000000000000000" pitchFamily="2" charset="2"/>
               </a:rPr>
               <a:t>.</a:t>
@@ -1746,7 +1762,7 @@
           <a:p>
             <a:fld id="{BC3895B0-21E2-43D3-9DA2-AFD642D82980}" type="datetimeFigureOut">
               <a:rPr lang="fr-CH" smtClean="0"/>
-              <a:t>25.01.2018</a:t>
+              <a:t>26.01.2018</a:t>
             </a:fld>
             <a:endParaRPr lang="fr-CH"/>
           </a:p>
@@ -2042,7 +2058,7 @@
           <a:p>
             <a:fld id="{BC3895B0-21E2-43D3-9DA2-AFD642D82980}" type="datetimeFigureOut">
               <a:rPr lang="fr-CH" smtClean="0"/>
-              <a:t>25.01.2018</a:t>
+              <a:t>26.01.2018</a:t>
             </a:fld>
             <a:endParaRPr lang="fr-CH"/>
           </a:p>
@@ -2290,7 +2306,7 @@
           <a:p>
             <a:fld id="{BC3895B0-21E2-43D3-9DA2-AFD642D82980}" type="datetimeFigureOut">
               <a:rPr lang="fr-CH" smtClean="0"/>
-              <a:t>25.01.2018</a:t>
+              <a:t>26.01.2018</a:t>
             </a:fld>
             <a:endParaRPr lang="fr-CH"/>
           </a:p>
@@ -2830,7 +2846,7 @@
           <a:p>
             <a:fld id="{BC3895B0-21E2-43D3-9DA2-AFD642D82980}" type="datetimeFigureOut">
               <a:rPr lang="fr-CH" smtClean="0"/>
-              <a:t>25.01.2018</a:t>
+              <a:t>26.01.2018</a:t>
             </a:fld>
             <a:endParaRPr lang="fr-CH"/>
           </a:p>
@@ -3078,7 +3094,7 @@
           <a:p>
             <a:fld id="{BC3895B0-21E2-43D3-9DA2-AFD642D82980}" type="datetimeFigureOut">
               <a:rPr lang="fr-CH" smtClean="0"/>
-              <a:t>25.01.2018</a:t>
+              <a:t>26.01.2018</a:t>
             </a:fld>
             <a:endParaRPr lang="fr-CH"/>
           </a:p>
@@ -3610,7 +3626,7 @@
           <a:p>
             <a:fld id="{BC3895B0-21E2-43D3-9DA2-AFD642D82980}" type="datetimeFigureOut">
               <a:rPr lang="fr-CH" smtClean="0"/>
-              <a:t>25.01.2018</a:t>
+              <a:t>26.01.2018</a:t>
             </a:fld>
             <a:endParaRPr lang="fr-CH"/>
           </a:p>
@@ -3907,7 +3923,7 @@
           <a:p>
             <a:fld id="{BC3895B0-21E2-43D3-9DA2-AFD642D82980}" type="datetimeFigureOut">
               <a:rPr lang="fr-CH" smtClean="0"/>
-              <a:t>25.01.2018</a:t>
+              <a:t>26.01.2018</a:t>
             </a:fld>
             <a:endParaRPr lang="fr-CH"/>
           </a:p>
@@ -4081,7 +4097,7 @@
           <a:p>
             <a:fld id="{BC3895B0-21E2-43D3-9DA2-AFD642D82980}" type="datetimeFigureOut">
               <a:rPr lang="fr-CH" smtClean="0"/>
-              <a:t>25.01.2018</a:t>
+              <a:t>26.01.2018</a:t>
             </a:fld>
             <a:endParaRPr lang="fr-CH"/>
           </a:p>
@@ -4261,7 +4277,7 @@
           <a:p>
             <a:fld id="{BC3895B0-21E2-43D3-9DA2-AFD642D82980}" type="datetimeFigureOut">
               <a:rPr lang="fr-CH" smtClean="0"/>
-              <a:t>25.01.2018</a:t>
+              <a:t>26.01.2018</a:t>
             </a:fld>
             <a:endParaRPr lang="fr-CH"/>
           </a:p>
@@ -4472,7 +4488,7 @@
           <a:p>
             <a:fld id="{BC3895B0-21E2-43D3-9DA2-AFD642D82980}" type="datetimeFigureOut">
               <a:rPr lang="fr-CH" smtClean="0"/>
-              <a:t>25.01.2018</a:t>
+              <a:t>26.01.2018</a:t>
             </a:fld>
             <a:endParaRPr lang="fr-CH"/>
           </a:p>
@@ -4723,7 +4739,7 @@
           <a:p>
             <a:fld id="{BC3895B0-21E2-43D3-9DA2-AFD642D82980}" type="datetimeFigureOut">
               <a:rPr lang="fr-CH" smtClean="0"/>
-              <a:t>25.01.2018</a:t>
+              <a:t>26.01.2018</a:t>
             </a:fld>
             <a:endParaRPr lang="fr-CH"/>
           </a:p>
@@ -5070,7 +5086,7 @@
           <a:p>
             <a:fld id="{BC3895B0-21E2-43D3-9DA2-AFD642D82980}" type="datetimeFigureOut">
               <a:rPr lang="fr-CH" smtClean="0"/>
-              <a:t>25.01.2018</a:t>
+              <a:t>26.01.2018</a:t>
             </a:fld>
             <a:endParaRPr lang="fr-CH"/>
           </a:p>
@@ -5562,7 +5578,7 @@
           <a:p>
             <a:fld id="{BC3895B0-21E2-43D3-9DA2-AFD642D82980}" type="datetimeFigureOut">
               <a:rPr lang="fr-CH" smtClean="0"/>
-              <a:t>25.01.2018</a:t>
+              <a:t>26.01.2018</a:t>
             </a:fld>
             <a:endParaRPr lang="fr-CH"/>
           </a:p>
@@ -5680,7 +5696,7 @@
           <a:p>
             <a:fld id="{BC3895B0-21E2-43D3-9DA2-AFD642D82980}" type="datetimeFigureOut">
               <a:rPr lang="fr-CH" smtClean="0"/>
-              <a:t>25.01.2018</a:t>
+              <a:t>26.01.2018</a:t>
             </a:fld>
             <a:endParaRPr lang="fr-CH"/>
           </a:p>
@@ -5775,7 +5791,7 @@
           <a:p>
             <a:fld id="{BC3895B0-21E2-43D3-9DA2-AFD642D82980}" type="datetimeFigureOut">
               <a:rPr lang="fr-CH" smtClean="0"/>
-              <a:t>25.01.2018</a:t>
+              <a:t>26.01.2018</a:t>
             </a:fld>
             <a:endParaRPr lang="fr-CH"/>
           </a:p>
@@ -6058,7 +6074,7 @@
           <a:p>
             <a:fld id="{BC3895B0-21E2-43D3-9DA2-AFD642D82980}" type="datetimeFigureOut">
               <a:rPr lang="fr-CH" smtClean="0"/>
-              <a:t>25.01.2018</a:t>
+              <a:t>26.01.2018</a:t>
             </a:fld>
             <a:endParaRPr lang="fr-CH"/>
           </a:p>
@@ -6349,7 +6365,7 @@
           <a:p>
             <a:fld id="{BC3895B0-21E2-43D3-9DA2-AFD642D82980}" type="datetimeFigureOut">
               <a:rPr lang="fr-CH" smtClean="0"/>
-              <a:t>25.01.2018</a:t>
+              <a:t>26.01.2018</a:t>
             </a:fld>
             <a:endParaRPr lang="fr-CH"/>
           </a:p>
@@ -6879,7 +6895,7 @@
           <a:p>
             <a:fld id="{BC3895B0-21E2-43D3-9DA2-AFD642D82980}" type="datetimeFigureOut">
               <a:rPr lang="fr-CH" smtClean="0"/>
-              <a:t>25.01.2018</a:t>
+              <a:t>26.01.2018</a:t>
             </a:fld>
             <a:endParaRPr lang="fr-CH"/>
           </a:p>
@@ -7415,7 +7431,7 @@
           <p:cNvPr id="2" name="Titre 1">
             <a:extLst>
               <a:ext uri="{FF2B5EF4-FFF2-40B4-BE49-F238E27FC236}">
-                <a16:creationId xmlns:a16="http://schemas.microsoft.com/office/drawing/2014/main" xmlns="" id="{0CFB33AD-2436-4082-A673-DA992A59D7CF}"/>
+                <a16:creationId xmlns:a16="http://schemas.microsoft.com/office/drawing/2014/main" id="{0CFB33AD-2436-4082-A673-DA992A59D7CF}"/>
               </a:ext>
             </a:extLst>
           </p:cNvPr>
@@ -7453,7 +7469,7 @@
           <p:cNvPr id="3" name="Sous-titre 2">
             <a:extLst>
               <a:ext uri="{FF2B5EF4-FFF2-40B4-BE49-F238E27FC236}">
-                <a16:creationId xmlns:a16="http://schemas.microsoft.com/office/drawing/2014/main" xmlns="" id="{9E2C14B6-E253-464E-B1EA-4FD993CE647E}"/>
+                <a16:creationId xmlns:a16="http://schemas.microsoft.com/office/drawing/2014/main" id="{9E2C14B6-E253-464E-B1EA-4FD993CE647E}"/>
               </a:ext>
             </a:extLst>
           </p:cNvPr>
@@ -7501,13 +7517,6 @@
   <p:clrMapOvr>
     <a:masterClrMapping/>
   </p:clrMapOvr>
-  <p:timing>
-    <p:tnLst>
-      <p:par>
-        <p:cTn id="1" dur="indefinite" restart="never" nodeType="tmRoot"/>
-      </p:par>
-    </p:tnLst>
-  </p:timing>
 </p:sld>
 </file>
 
@@ -7533,7 +7542,7 @@
           <p:cNvPr id="2" name="Titre 1">
             <a:extLst>
               <a:ext uri="{FF2B5EF4-FFF2-40B4-BE49-F238E27FC236}">
-                <a16:creationId xmlns:a16="http://schemas.microsoft.com/office/drawing/2014/main" xmlns="" id="{E3F33306-D4C8-47FD-B767-4C26F1291E90}"/>
+                <a16:creationId xmlns:a16="http://schemas.microsoft.com/office/drawing/2014/main" id="{E3F33306-D4C8-47FD-B767-4C26F1291E90}"/>
               </a:ext>
             </a:extLst>
           </p:cNvPr>
@@ -7567,7 +7576,7 @@
           <p:cNvPr id="3" name="Espace réservé du contenu 2">
             <a:extLst>
               <a:ext uri="{FF2B5EF4-FFF2-40B4-BE49-F238E27FC236}">
-                <a16:creationId xmlns:a16="http://schemas.microsoft.com/office/drawing/2014/main" xmlns="" id="{E2D72BF4-97A8-4FF9-9406-29B2A8E42FC2}"/>
+                <a16:creationId xmlns:a16="http://schemas.microsoft.com/office/drawing/2014/main" id="{E2D72BF4-97A8-4FF9-9406-29B2A8E42FC2}"/>
               </a:ext>
             </a:extLst>
           </p:cNvPr>
@@ -7652,13 +7661,6 @@
   <p:clrMapOvr>
     <a:masterClrMapping/>
   </p:clrMapOvr>
-  <p:timing>
-    <p:tnLst>
-      <p:par>
-        <p:cTn id="1" dur="indefinite" restart="never" nodeType="tmRoot"/>
-      </p:par>
-    </p:tnLst>
-  </p:timing>
 </p:sld>
 </file>
 
@@ -7684,7 +7686,7 @@
           <p:cNvPr id="2" name="Titre 1">
             <a:extLst>
               <a:ext uri="{FF2B5EF4-FFF2-40B4-BE49-F238E27FC236}">
-                <a16:creationId xmlns:a16="http://schemas.microsoft.com/office/drawing/2014/main" xmlns="" id="{E3F33306-D4C8-47FD-B767-4C26F1291E90}"/>
+                <a16:creationId xmlns:a16="http://schemas.microsoft.com/office/drawing/2014/main" id="{E3F33306-D4C8-47FD-B767-4C26F1291E90}"/>
               </a:ext>
             </a:extLst>
           </p:cNvPr>
@@ -7749,7 +7751,7 @@
           <p:cNvPr id="2" name="Titre 1">
             <a:extLst>
               <a:ext uri="{FF2B5EF4-FFF2-40B4-BE49-F238E27FC236}">
-                <a16:creationId xmlns:a16="http://schemas.microsoft.com/office/drawing/2014/main" xmlns="" id="{E3F33306-D4C8-47FD-B767-4C26F1291E90}"/>
+                <a16:creationId xmlns:a16="http://schemas.microsoft.com/office/drawing/2014/main" id="{E3F33306-D4C8-47FD-B767-4C26F1291E90}"/>
               </a:ext>
             </a:extLst>
           </p:cNvPr>
@@ -7783,7 +7785,7 @@
           <p:cNvPr id="4" name="Espace réservé du contenu 2">
             <a:extLst>
               <a:ext uri="{FF2B5EF4-FFF2-40B4-BE49-F238E27FC236}">
-                <a16:creationId xmlns:a16="http://schemas.microsoft.com/office/drawing/2014/main" xmlns="" id="{049C4395-38C4-4B0C-8910-A8F7BF702D03}"/>
+                <a16:creationId xmlns:a16="http://schemas.microsoft.com/office/drawing/2014/main" id="{049C4395-38C4-4B0C-8910-A8F7BF702D03}"/>
               </a:ext>
             </a:extLst>
           </p:cNvPr>
@@ -8078,7 +8080,7 @@
           <p:cNvPr id="7" name="Image 6">
             <a:extLst>
               <a:ext uri="{FF2B5EF4-FFF2-40B4-BE49-F238E27FC236}">
-                <a16:creationId xmlns:a16="http://schemas.microsoft.com/office/drawing/2014/main" xmlns="" id="{660BB3DA-E17E-4553-9B13-8D9843788D48}"/>
+                <a16:creationId xmlns:a16="http://schemas.microsoft.com/office/drawing/2014/main" id="{660BB3DA-E17E-4553-9B13-8D9843788D48}"/>
               </a:ext>
             </a:extLst>
           </p:cNvPr>
@@ -8119,13 +8121,6 @@
   <p:clrMapOvr>
     <a:masterClrMapping/>
   </p:clrMapOvr>
-  <p:timing>
-    <p:tnLst>
-      <p:par>
-        <p:cTn id="1" dur="indefinite" restart="never" nodeType="tmRoot"/>
-      </p:par>
-    </p:tnLst>
-  </p:timing>
 </p:sld>
 </file>
 
@@ -8151,7 +8146,7 @@
           <p:cNvPr id="2" name="Titre 1">
             <a:extLst>
               <a:ext uri="{FF2B5EF4-FFF2-40B4-BE49-F238E27FC236}">
-                <a16:creationId xmlns:a16="http://schemas.microsoft.com/office/drawing/2014/main" xmlns="" id="{E3F33306-D4C8-47FD-B767-4C26F1291E90}"/>
+                <a16:creationId xmlns:a16="http://schemas.microsoft.com/office/drawing/2014/main" id="{E3F33306-D4C8-47FD-B767-4C26F1291E90}"/>
               </a:ext>
             </a:extLst>
           </p:cNvPr>
@@ -8185,7 +8180,7 @@
           <p:cNvPr id="3" name="Espace réservé du contenu 2">
             <a:extLst>
               <a:ext uri="{FF2B5EF4-FFF2-40B4-BE49-F238E27FC236}">
-                <a16:creationId xmlns:a16="http://schemas.microsoft.com/office/drawing/2014/main" xmlns="" id="{E2D72BF4-97A8-4FF9-9406-29B2A8E42FC2}"/>
+                <a16:creationId xmlns:a16="http://schemas.microsoft.com/office/drawing/2014/main" id="{E2D72BF4-97A8-4FF9-9406-29B2A8E42FC2}"/>
               </a:ext>
             </a:extLst>
           </p:cNvPr>
@@ -8269,7 +8264,7 @@
           <p:cNvPr id="2" name="Titre 1">
             <a:extLst>
               <a:ext uri="{FF2B5EF4-FFF2-40B4-BE49-F238E27FC236}">
-                <a16:creationId xmlns:a16="http://schemas.microsoft.com/office/drawing/2014/main" xmlns="" id="{E3F33306-D4C8-47FD-B767-4C26F1291E90}"/>
+                <a16:creationId xmlns:a16="http://schemas.microsoft.com/office/drawing/2014/main" id="{E3F33306-D4C8-47FD-B767-4C26F1291E90}"/>
               </a:ext>
             </a:extLst>
           </p:cNvPr>
@@ -8303,7 +8298,7 @@
           <p:cNvPr id="3" name="Espace réservé du contenu 2">
             <a:extLst>
               <a:ext uri="{FF2B5EF4-FFF2-40B4-BE49-F238E27FC236}">
-                <a16:creationId xmlns:a16="http://schemas.microsoft.com/office/drawing/2014/main" xmlns="" id="{E2D72BF4-97A8-4FF9-9406-29B2A8E42FC2}"/>
+                <a16:creationId xmlns:a16="http://schemas.microsoft.com/office/drawing/2014/main" id="{E2D72BF4-97A8-4FF9-9406-29B2A8E42FC2}"/>
               </a:ext>
             </a:extLst>
           </p:cNvPr>
@@ -8409,7 +8404,7 @@
           <p:cNvPr id="67" name="Group 35">
             <a:extLst>
               <a:ext uri="{FF2B5EF4-FFF2-40B4-BE49-F238E27FC236}">
-                <a16:creationId xmlns:a16="http://schemas.microsoft.com/office/drawing/2014/main" xmlns="" id="{D6BA167A-D3C3-4EE8-8B5E-13679208725E}"/>
+                <a16:creationId xmlns:a16="http://schemas.microsoft.com/office/drawing/2014/main" id="{D6BA167A-D3C3-4EE8-8B5E-13679208725E}"/>
               </a:ext>
             </a:extLst>
           </p:cNvPr>
@@ -8419,7 +8414,7 @@
           <p:nvPr>
             <p:extLst>
               <p:ext uri="{386F3935-93C4-4BCD-93E2-E3B085C9AB24}">
-                <p16:designElem xmlns:p16="http://schemas.microsoft.com/office/powerpoint/2015/main" xmlns="" val="1"/>
+                <p16:designElem xmlns:p16="http://schemas.microsoft.com/office/powerpoint/2015/main" val="1"/>
               </p:ext>
             </p:extLst>
           </p:nvPr>
@@ -8437,7 +8432,7 @@
             <p:cNvPr id="37" name="Freeform 6">
               <a:extLst>
                 <a:ext uri="{FF2B5EF4-FFF2-40B4-BE49-F238E27FC236}">
-                  <a16:creationId xmlns:a16="http://schemas.microsoft.com/office/drawing/2014/main" xmlns="" id="{810CA83B-630E-45DB-ADCB-F0260428513D}"/>
+                  <a16:creationId xmlns:a16="http://schemas.microsoft.com/office/drawing/2014/main" id="{810CA83B-630E-45DB-ADCB-F0260428513D}"/>
                 </a:ext>
               </a:extLst>
             </p:cNvPr>
@@ -8445,7 +8440,7 @@
             <p:nvPr>
               <p:extLst>
                 <p:ext uri="{386F3935-93C4-4BCD-93E2-E3B085C9AB24}">
-                  <p16:designElem xmlns:p16="http://schemas.microsoft.com/office/powerpoint/2015/main" xmlns="" val="1"/>
+                  <p16:designElem xmlns:p16="http://schemas.microsoft.com/office/powerpoint/2015/main" val="1"/>
                 </p:ext>
               </p:extLst>
             </p:nvPr>
@@ -8495,7 +8490,7 @@
             <p:cNvPr id="38" name="Freeform 7">
               <a:extLst>
                 <a:ext uri="{FF2B5EF4-FFF2-40B4-BE49-F238E27FC236}">
-                  <a16:creationId xmlns:a16="http://schemas.microsoft.com/office/drawing/2014/main" xmlns="" id="{7A57B554-6973-429A-818B-524C03DA479E}"/>
+                  <a16:creationId xmlns:a16="http://schemas.microsoft.com/office/drawing/2014/main" id="{7A57B554-6973-429A-818B-524C03DA479E}"/>
                 </a:ext>
               </a:extLst>
             </p:cNvPr>
@@ -8503,7 +8498,7 @@
             <p:nvPr>
               <p:extLst>
                 <p:ext uri="{386F3935-93C4-4BCD-93E2-E3B085C9AB24}">
-                  <p16:designElem xmlns:p16="http://schemas.microsoft.com/office/powerpoint/2015/main" xmlns="" val="1"/>
+                  <p16:designElem xmlns:p16="http://schemas.microsoft.com/office/powerpoint/2015/main" val="1"/>
                 </p:ext>
               </p:extLst>
             </p:nvPr>
@@ -8559,7 +8554,7 @@
             <p:cNvPr id="39" name="Freeform 9">
               <a:extLst>
                 <a:ext uri="{FF2B5EF4-FFF2-40B4-BE49-F238E27FC236}">
-                  <a16:creationId xmlns:a16="http://schemas.microsoft.com/office/drawing/2014/main" xmlns="" id="{89ED2DB2-F3BB-4B5E-84E6-CC259E394AF3}"/>
+                  <a16:creationId xmlns:a16="http://schemas.microsoft.com/office/drawing/2014/main" id="{89ED2DB2-F3BB-4B5E-84E6-CC259E394AF3}"/>
                 </a:ext>
               </a:extLst>
             </p:cNvPr>
@@ -8567,7 +8562,7 @@
             <p:nvPr>
               <p:extLst>
                 <p:ext uri="{386F3935-93C4-4BCD-93E2-E3B085C9AB24}">
-                  <p16:designElem xmlns:p16="http://schemas.microsoft.com/office/powerpoint/2015/main" xmlns="" val="1"/>
+                  <p16:designElem xmlns:p16="http://schemas.microsoft.com/office/powerpoint/2015/main" val="1"/>
                 </p:ext>
               </p:extLst>
             </p:nvPr>
@@ -8617,7 +8612,7 @@
             <p:cNvPr id="40" name="Freeform 10">
               <a:extLst>
                 <a:ext uri="{FF2B5EF4-FFF2-40B4-BE49-F238E27FC236}">
-                  <a16:creationId xmlns:a16="http://schemas.microsoft.com/office/drawing/2014/main" xmlns="" id="{93816493-5723-43CF-95A9-2CDEC9B11D76}"/>
+                  <a16:creationId xmlns:a16="http://schemas.microsoft.com/office/drawing/2014/main" id="{93816493-5723-43CF-95A9-2CDEC9B11D76}"/>
                 </a:ext>
               </a:extLst>
             </p:cNvPr>
@@ -8625,7 +8620,7 @@
             <p:nvPr>
               <p:extLst>
                 <p:ext uri="{386F3935-93C4-4BCD-93E2-E3B085C9AB24}">
-                  <p16:designElem xmlns:p16="http://schemas.microsoft.com/office/powerpoint/2015/main" xmlns="" val="1"/>
+                  <p16:designElem xmlns:p16="http://schemas.microsoft.com/office/powerpoint/2015/main" val="1"/>
                 </p:ext>
               </p:extLst>
             </p:nvPr>
@@ -8674,7 +8669,7 @@
             <p:cNvPr id="41" name="Freeform 11">
               <a:extLst>
                 <a:ext uri="{FF2B5EF4-FFF2-40B4-BE49-F238E27FC236}">
-                  <a16:creationId xmlns:a16="http://schemas.microsoft.com/office/drawing/2014/main" xmlns="" id="{A9964935-0316-4743-BD2E-35B86AF480C4}"/>
+                  <a16:creationId xmlns:a16="http://schemas.microsoft.com/office/drawing/2014/main" id="{A9964935-0316-4743-BD2E-35B86AF480C4}"/>
                 </a:ext>
               </a:extLst>
             </p:cNvPr>
@@ -8682,7 +8677,7 @@
             <p:nvPr>
               <p:extLst>
                 <p:ext uri="{386F3935-93C4-4BCD-93E2-E3B085C9AB24}">
-                  <p16:designElem xmlns:p16="http://schemas.microsoft.com/office/powerpoint/2015/main" xmlns="" val="1"/>
+                  <p16:designElem xmlns:p16="http://schemas.microsoft.com/office/powerpoint/2015/main" val="1"/>
                 </p:ext>
               </p:extLst>
             </p:nvPr>
@@ -8737,7 +8732,7 @@
             <p:cNvPr id="42" name="Freeform 12">
               <a:extLst>
                 <a:ext uri="{FF2B5EF4-FFF2-40B4-BE49-F238E27FC236}">
-                  <a16:creationId xmlns:a16="http://schemas.microsoft.com/office/drawing/2014/main" xmlns="" id="{2B20A700-1547-48D5-AA6F-C1473539C70F}"/>
+                  <a16:creationId xmlns:a16="http://schemas.microsoft.com/office/drawing/2014/main" id="{2B20A700-1547-48D5-AA6F-C1473539C70F}"/>
                 </a:ext>
               </a:extLst>
             </p:cNvPr>
@@ -8745,7 +8740,7 @@
             <p:nvPr>
               <p:extLst>
                 <p:ext uri="{386F3935-93C4-4BCD-93E2-E3B085C9AB24}">
-                  <p16:designElem xmlns:p16="http://schemas.microsoft.com/office/powerpoint/2015/main" xmlns="" val="1"/>
+                  <p16:designElem xmlns:p16="http://schemas.microsoft.com/office/powerpoint/2015/main" val="1"/>
                 </p:ext>
               </p:extLst>
             </p:nvPr>
@@ -8808,7 +8803,7 @@
           <p:cNvPr id="68" name="Image 3">
             <a:extLst>
               <a:ext uri="{FF2B5EF4-FFF2-40B4-BE49-F238E27FC236}">
-                <a16:creationId xmlns:a16="http://schemas.microsoft.com/office/drawing/2014/main" xmlns="" id="{18141A38-AC60-4E7E-8F00-FFAA456581A5}"/>
+                <a16:creationId xmlns:a16="http://schemas.microsoft.com/office/drawing/2014/main" id="{18141A38-AC60-4E7E-8F00-FFAA456581A5}"/>
               </a:ext>
             </a:extLst>
           </p:cNvPr>
@@ -8864,7 +8859,7 @@
           <p:cNvPr id="2" name="Titre 1">
             <a:extLst>
               <a:ext uri="{FF2B5EF4-FFF2-40B4-BE49-F238E27FC236}">
-                <a16:creationId xmlns:a16="http://schemas.microsoft.com/office/drawing/2014/main" xmlns="" id="{CA7F0D2B-BBB7-4CF6-824A-DFB52F783BF6}"/>
+                <a16:creationId xmlns:a16="http://schemas.microsoft.com/office/drawing/2014/main" id="{CA7F0D2B-BBB7-4CF6-824A-DFB52F783BF6}"/>
               </a:ext>
             </a:extLst>
           </p:cNvPr>
@@ -8942,7 +8937,7 @@
           <p:cNvPr id="2" name="Titre 1">
             <a:extLst>
               <a:ext uri="{FF2B5EF4-FFF2-40B4-BE49-F238E27FC236}">
-                <a16:creationId xmlns:a16="http://schemas.microsoft.com/office/drawing/2014/main" xmlns="" id="{E3F33306-D4C8-47FD-B767-4C26F1291E90}"/>
+                <a16:creationId xmlns:a16="http://schemas.microsoft.com/office/drawing/2014/main" id="{E3F33306-D4C8-47FD-B767-4C26F1291E90}"/>
               </a:ext>
             </a:extLst>
           </p:cNvPr>
@@ -8976,7 +8971,7 @@
           <p:cNvPr id="3" name="Espace réservé du contenu 2">
             <a:extLst>
               <a:ext uri="{FF2B5EF4-FFF2-40B4-BE49-F238E27FC236}">
-                <a16:creationId xmlns:a16="http://schemas.microsoft.com/office/drawing/2014/main" xmlns="" id="{E2D72BF4-97A8-4FF9-9406-29B2A8E42FC2}"/>
+                <a16:creationId xmlns:a16="http://schemas.microsoft.com/office/drawing/2014/main" id="{E2D72BF4-97A8-4FF9-9406-29B2A8E42FC2}"/>
               </a:ext>
             </a:extLst>
           </p:cNvPr>
@@ -9030,7 +9025,7 @@
           <p:cNvPr id="4" name="Image 3">
             <a:extLst>
               <a:ext uri="{FF2B5EF4-FFF2-40B4-BE49-F238E27FC236}">
-                <a16:creationId xmlns:a16="http://schemas.microsoft.com/office/drawing/2014/main" xmlns="" id="{FAF10768-8CD8-4EE8-98C2-8C9C124CCFC6}"/>
+                <a16:creationId xmlns:a16="http://schemas.microsoft.com/office/drawing/2014/main" id="{FAF10768-8CD8-4EE8-98C2-8C9C124CCFC6}"/>
               </a:ext>
             </a:extLst>
           </p:cNvPr>
@@ -9060,7 +9055,7 @@
           <p:cNvPr id="5" name="Image 4">
             <a:extLst>
               <a:ext uri="{FF2B5EF4-FFF2-40B4-BE49-F238E27FC236}">
-                <a16:creationId xmlns:a16="http://schemas.microsoft.com/office/drawing/2014/main" xmlns="" id="{07C8896F-D9DD-4F5E-B4CD-7B458002FB07}"/>
+                <a16:creationId xmlns:a16="http://schemas.microsoft.com/office/drawing/2014/main" id="{07C8896F-D9DD-4F5E-B4CD-7B458002FB07}"/>
               </a:ext>
             </a:extLst>
           </p:cNvPr>
@@ -9090,7 +9085,7 @@
           <p:cNvPr id="6" name="Image 5">
             <a:extLst>
               <a:ext uri="{FF2B5EF4-FFF2-40B4-BE49-F238E27FC236}">
-                <a16:creationId xmlns:a16="http://schemas.microsoft.com/office/drawing/2014/main" xmlns="" id="{E7EF9D6E-222B-4579-BB16-23E565DB9B51}"/>
+                <a16:creationId xmlns:a16="http://schemas.microsoft.com/office/drawing/2014/main" id="{E7EF9D6E-222B-4579-BB16-23E565DB9B51}"/>
               </a:ext>
             </a:extLst>
           </p:cNvPr>
@@ -9120,7 +9115,7 @@
           <p:cNvPr id="7" name="Image 6">
             <a:extLst>
               <a:ext uri="{FF2B5EF4-FFF2-40B4-BE49-F238E27FC236}">
-                <a16:creationId xmlns:a16="http://schemas.microsoft.com/office/drawing/2014/main" xmlns="" id="{1AACB9B4-3BEE-49F9-B84B-98CF69073D91}"/>
+                <a16:creationId xmlns:a16="http://schemas.microsoft.com/office/drawing/2014/main" id="{1AACB9B4-3BEE-49F9-B84B-98CF69073D91}"/>
               </a:ext>
             </a:extLst>
           </p:cNvPr>
@@ -9150,7 +9145,7 @@
           <p:cNvPr id="8" name="Image 7">
             <a:extLst>
               <a:ext uri="{FF2B5EF4-FFF2-40B4-BE49-F238E27FC236}">
-                <a16:creationId xmlns:a16="http://schemas.microsoft.com/office/drawing/2014/main" xmlns="" id="{4BD348E5-9ADC-4CAB-861F-210D20AE68DB}"/>
+                <a16:creationId xmlns:a16="http://schemas.microsoft.com/office/drawing/2014/main" id="{4BD348E5-9ADC-4CAB-861F-210D20AE68DB}"/>
               </a:ext>
             </a:extLst>
           </p:cNvPr>
@@ -9510,7 +9505,7 @@
           <p:cNvPr id="2" name="Titre 1">
             <a:extLst>
               <a:ext uri="{FF2B5EF4-FFF2-40B4-BE49-F238E27FC236}">
-                <a16:creationId xmlns:a16="http://schemas.microsoft.com/office/drawing/2014/main" xmlns="" id="{E3F33306-D4C8-47FD-B767-4C26F1291E90}"/>
+                <a16:creationId xmlns:a16="http://schemas.microsoft.com/office/drawing/2014/main" id="{E3F33306-D4C8-47FD-B767-4C26F1291E90}"/>
               </a:ext>
             </a:extLst>
           </p:cNvPr>
@@ -9544,7 +9539,7 @@
           <p:cNvPr id="4" name="Image 3">
             <a:extLst>
               <a:ext uri="{FF2B5EF4-FFF2-40B4-BE49-F238E27FC236}">
-                <a16:creationId xmlns:a16="http://schemas.microsoft.com/office/drawing/2014/main" xmlns="" id="{2687339F-4F5B-4691-97F3-898FC5A89D2D}"/>
+                <a16:creationId xmlns:a16="http://schemas.microsoft.com/office/drawing/2014/main" id="{2687339F-4F5B-4691-97F3-898FC5A89D2D}"/>
               </a:ext>
             </a:extLst>
           </p:cNvPr>
@@ -9580,7 +9575,7 @@
           <p:cNvPr id="5" name="Espace réservé du contenu 2">
             <a:extLst>
               <a:ext uri="{FF2B5EF4-FFF2-40B4-BE49-F238E27FC236}">
-                <a16:creationId xmlns:a16="http://schemas.microsoft.com/office/drawing/2014/main" xmlns="" id="{CEB61D05-2C97-4939-9A58-2F5E68DED6BF}"/>
+                <a16:creationId xmlns:a16="http://schemas.microsoft.com/office/drawing/2014/main" id="{CEB61D05-2C97-4939-9A58-2F5E68DED6BF}"/>
               </a:ext>
             </a:extLst>
           </p:cNvPr>
@@ -9666,7 +9661,7 @@
           <p:cNvPr id="2" name="Titre 1">
             <a:extLst>
               <a:ext uri="{FF2B5EF4-FFF2-40B4-BE49-F238E27FC236}">
-                <a16:creationId xmlns:a16="http://schemas.microsoft.com/office/drawing/2014/main" xmlns="" id="{E3F33306-D4C8-47FD-B767-4C26F1291E90}"/>
+                <a16:creationId xmlns:a16="http://schemas.microsoft.com/office/drawing/2014/main" id="{E3F33306-D4C8-47FD-B767-4C26F1291E90}"/>
               </a:ext>
             </a:extLst>
           </p:cNvPr>
@@ -9700,7 +9695,7 @@
           <p:cNvPr id="3" name="Espace réservé du contenu 2">
             <a:extLst>
               <a:ext uri="{FF2B5EF4-FFF2-40B4-BE49-F238E27FC236}">
-                <a16:creationId xmlns:a16="http://schemas.microsoft.com/office/drawing/2014/main" xmlns="" id="{E2D72BF4-97A8-4FF9-9406-29B2A8E42FC2}"/>
+                <a16:creationId xmlns:a16="http://schemas.microsoft.com/office/drawing/2014/main" id="{E2D72BF4-97A8-4FF9-9406-29B2A8E42FC2}"/>
               </a:ext>
             </a:extLst>
           </p:cNvPr>
@@ -9768,7 +9763,7 @@
           <p:cNvPr id="7" name="Image 6">
             <a:extLst>
               <a:ext uri="{FF2B5EF4-FFF2-40B4-BE49-F238E27FC236}">
-                <a16:creationId xmlns:a16="http://schemas.microsoft.com/office/drawing/2014/main" xmlns="" id="{2D8FE7BE-EB47-4600-97C2-2F17178C74FE}"/>
+                <a16:creationId xmlns:a16="http://schemas.microsoft.com/office/drawing/2014/main" id="{2D8FE7BE-EB47-4600-97C2-2F17178C74FE}"/>
               </a:ext>
             </a:extLst>
           </p:cNvPr>
@@ -9809,13 +9804,6 @@
   <p:clrMapOvr>
     <a:masterClrMapping/>
   </p:clrMapOvr>
-  <p:timing>
-    <p:tnLst>
-      <p:par>
-        <p:cTn id="1" dur="indefinite" restart="never" nodeType="tmRoot"/>
-      </p:par>
-    </p:tnLst>
-  </p:timing>
 </p:sld>
 </file>
 
@@ -9841,7 +9829,7 @@
           <p:cNvPr id="2" name="Titre 1">
             <a:extLst>
               <a:ext uri="{FF2B5EF4-FFF2-40B4-BE49-F238E27FC236}">
-                <a16:creationId xmlns:a16="http://schemas.microsoft.com/office/drawing/2014/main" xmlns="" id="{E3F33306-D4C8-47FD-B767-4C26F1291E90}"/>
+                <a16:creationId xmlns:a16="http://schemas.microsoft.com/office/drawing/2014/main" id="{E3F33306-D4C8-47FD-B767-4C26F1291E90}"/>
               </a:ext>
             </a:extLst>
           </p:cNvPr>

</xml_diff>